<commit_message>
fix gcd termination in number_theory
</commit_message>
<xml_diff>
--- a/spring11/slides11/slides5m.pptx
+++ b/spring11/slides11/slides5m.pptx
@@ -12682,7 +12682,7 @@
                   <a:srgbClr val="000000"/>
                 </a:solidFill>
               </a:rPr>
-              <a:t>at each </a:t>
+              <a:t>at</a:t>
             </a:r>
             <a:r>
               <a:rPr lang="en-US" sz="5400" dirty="0" smtClean="0">
@@ -12690,8 +12690,13 @@
                   <a:srgbClr val="000000"/>
                 </a:solidFill>
               </a:rPr>
-              <a:t>step</a:t>
-            </a:r>
+              <a:t> every other step</a:t>
+            </a:r>
+            <a:endParaRPr lang="en-US" sz="5400" dirty="0" smtClean="0">
+              <a:solidFill>
+                <a:srgbClr val="000000"/>
+              </a:solidFill>
+            </a:endParaRPr>
           </a:p>
           <a:p>
             <a:pPr marL="304800" indent="-304800" eaLnBrk="1" hangingPunct="1">
@@ -12733,7 +12738,27 @@
                 <a:latin typeface="Euclid Symbol" charset="2"/>
                 <a:cs typeface="Euclid Symbol" charset="2"/>
               </a:rPr>
-              <a:t>                </a:t>
+              <a:t>               </a:t>
+            </a:r>
+            <a:r>
+              <a:rPr lang="en-US" sz="5400" dirty="0" smtClean="0">
+                <a:solidFill>
+                  <a:srgbClr val="0000E5"/>
+                </a:solidFill>
+                <a:latin typeface="Comic Sans MS"/>
+                <a:cs typeface="Comic Sans MS"/>
+              </a:rPr>
+              <a:t> 2</a:t>
+            </a:r>
+            <a:r>
+              <a:rPr lang="en-US" sz="5400" dirty="0" smtClean="0">
+                <a:solidFill>
+                  <a:srgbClr val="0000E5"/>
+                </a:solidFill>
+                <a:latin typeface="Euclid Symbol" charset="2"/>
+                <a:cs typeface="Euclid Symbol" charset="2"/>
+              </a:rPr>
+              <a:t> </a:t>
             </a:r>
             <a:r>
               <a:rPr lang="en-US" sz="5400" dirty="0" smtClean="0">

</xml_diff>